<commit_message>
adding data to median table of figure 2
</commit_message>
<xml_diff>
--- a/figures/figure2/figure2-2.pptx
+++ b/figures/figure2/figure2-2.pptx
@@ -2973,6 +2973,36 @@
       </p:grpSpPr>
       <p:pic>
         <p:nvPicPr>
+          <p:cNvPr id="13" name="Picture 12">
+            <a:extLst>
+              <a:ext uri="{FF2B5EF4-FFF2-40B4-BE49-F238E27FC236}">
+                <a16:creationId xmlns:a16="http://schemas.microsoft.com/office/drawing/2014/main" id="{7C9970F3-B801-F44E-B74E-05FAECD6486F}"/>
+              </a:ext>
+            </a:extLst>
+          </p:cNvPr>
+          <p:cNvPicPr>
+            <a:picLocks noChangeAspect="1"/>
+          </p:cNvPicPr>
+          <p:nvPr/>
+        </p:nvPicPr>
+        <p:blipFill>
+          <a:blip r:embed="rId2"/>
+          <a:stretch>
+            <a:fillRect/>
+          </a:stretch>
+        </p:blipFill>
+        <p:spPr>
+          <a:xfrm>
+            <a:off x="-643502" y="-752693"/>
+            <a:ext cx="8557588" cy="5990312"/>
+          </a:xfrm>
+          <a:prstGeom prst="rect">
+            <a:avLst/>
+          </a:prstGeom>
+        </p:spPr>
+      </p:pic>
+      <p:pic>
+        <p:nvPicPr>
           <p:cNvPr id="66" name="Graphic 65">
             <a:extLst>
               <a:ext uri="{FF2B5EF4-FFF2-40B4-BE49-F238E27FC236}">
@@ -2986,10 +3016,10 @@
           <p:nvPr/>
         </p:nvPicPr>
         <p:blipFill>
-          <a:blip r:embed="rId2">
+          <a:blip r:embed="rId3">
             <a:extLst>
               <a:ext uri="{96DAC541-7B7A-43D3-8B79-37D633B846F1}">
-                <asvg:svgBlip xmlns:asvg="http://schemas.microsoft.com/office/drawing/2016/SVG/main" r:embed="rId3"/>
+                <asvg:svgBlip xmlns:asvg="http://schemas.microsoft.com/office/drawing/2016/SVG/main" r:embed="rId4"/>
               </a:ext>
             </a:extLst>
           </a:blip>
@@ -2999,7 +3029,7 @@
         </p:blipFill>
         <p:spPr>
           <a:xfrm>
-            <a:off x="124726" y="5046786"/>
+            <a:off x="-136532" y="4720211"/>
             <a:ext cx="7399796" cy="5990312"/>
           </a:xfrm>
           <a:prstGeom prst="rect">
@@ -3007,93 +3037,6 @@
           </a:prstGeom>
         </p:spPr>
       </p:pic>
-      <p:grpSp>
-        <p:nvGrpSpPr>
-          <p:cNvPr id="82" name="Group 81">
-            <a:extLst>
-              <a:ext uri="{FF2B5EF4-FFF2-40B4-BE49-F238E27FC236}">
-                <a16:creationId xmlns:a16="http://schemas.microsoft.com/office/drawing/2014/main" id="{2D6F0F45-69BD-8642-B808-FA0D6F2FCFD4}"/>
-              </a:ext>
-            </a:extLst>
-          </p:cNvPr>
-          <p:cNvGrpSpPr/>
-          <p:nvPr/>
-        </p:nvGrpSpPr>
-        <p:grpSpPr>
-          <a:xfrm>
-            <a:off x="744427" y="-791347"/>
-            <a:ext cx="6062870" cy="6062870"/>
-            <a:chOff x="0" y="7799471"/>
-            <a:chExt cx="5433496" cy="5433496"/>
-          </a:xfrm>
-        </p:grpSpPr>
-        <p:pic>
-          <p:nvPicPr>
-            <p:cNvPr id="73" name="Picture 72">
-              <a:extLst>
-                <a:ext uri="{FF2B5EF4-FFF2-40B4-BE49-F238E27FC236}">
-                  <a16:creationId xmlns:a16="http://schemas.microsoft.com/office/drawing/2014/main" id="{58878B76-C476-B547-ABD6-46228F3FC422}"/>
-                </a:ext>
-              </a:extLst>
-            </p:cNvPr>
-            <p:cNvPicPr>
-              <a:picLocks noChangeAspect="1"/>
-            </p:cNvPicPr>
-            <p:nvPr/>
-          </p:nvPicPr>
-          <p:blipFill>
-            <a:blip r:embed="rId4"/>
-            <a:stretch>
-              <a:fillRect/>
-            </a:stretch>
-          </p:blipFill>
-          <p:spPr>
-            <a:xfrm>
-              <a:off x="0" y="7799471"/>
-              <a:ext cx="5433496" cy="5433496"/>
-            </a:xfrm>
-            <a:prstGeom prst="rect">
-              <a:avLst/>
-            </a:prstGeom>
-          </p:spPr>
-        </p:pic>
-        <p:sp>
-          <p:nvSpPr>
-            <p:cNvPr id="79" name="TextBox 78">
-              <a:extLst>
-                <a:ext uri="{FF2B5EF4-FFF2-40B4-BE49-F238E27FC236}">
-                  <a16:creationId xmlns:a16="http://schemas.microsoft.com/office/drawing/2014/main" id="{F0BAD050-B028-6B48-AED7-63D498D6ACB5}"/>
-                </a:ext>
-              </a:extLst>
-            </p:cNvPr>
-            <p:cNvSpPr txBox="1"/>
-            <p:nvPr/>
-          </p:nvSpPr>
-          <p:spPr>
-            <a:xfrm>
-              <a:off x="1036141" y="8424819"/>
-              <a:ext cx="3303085" cy="330992"/>
-            </a:xfrm>
-            <a:prstGeom prst="rect">
-              <a:avLst/>
-            </a:prstGeom>
-            <a:noFill/>
-          </p:spPr>
-          <p:txBody>
-            <a:bodyPr wrap="none" rtlCol="0">
-              <a:spAutoFit/>
-            </a:bodyPr>
-            <a:lstStyle/>
-            <a:p>
-              <a:pPr algn="ctr"/>
-              <a:r>
-                <a:rPr lang="en-US" b="1" dirty="0"/>
-                <a:t>Summary of mapped taxon pair ages</a:t>
-              </a:r>
-            </a:p>
-          </p:txBody>
-        </p:sp>
-      </p:grpSp>
       <p:grpSp>
         <p:nvGrpSpPr>
           <p:cNvPr id="2" name="Group 1">
@@ -3108,7 +3051,7 @@
         </p:nvGrpSpPr>
         <p:grpSpPr>
           <a:xfrm>
-            <a:off x="2717233" y="4182952"/>
+            <a:off x="5434466" y="4269943"/>
             <a:ext cx="2155372" cy="917107"/>
             <a:chOff x="2453248" y="4485048"/>
             <a:chExt cx="2155372" cy="917107"/>
@@ -3212,6 +3155,42 @@
           </p:txBody>
         </p:sp>
       </p:grpSp>
+      <p:sp>
+        <p:nvSpPr>
+          <p:cNvPr id="14" name="TextBox 13">
+            <a:extLst>
+              <a:ext uri="{FF2B5EF4-FFF2-40B4-BE49-F238E27FC236}">
+                <a16:creationId xmlns:a16="http://schemas.microsoft.com/office/drawing/2014/main" id="{8C24BACC-3160-0546-98B2-9D31509E80A8}"/>
+              </a:ext>
+            </a:extLst>
+          </p:cNvPr>
+          <p:cNvSpPr txBox="1"/>
+          <p:nvPr/>
+        </p:nvSpPr>
+        <p:spPr>
+          <a:xfrm>
+            <a:off x="1598261" y="0"/>
+            <a:ext cx="4074065" cy="369332"/>
+          </a:xfrm>
+          <a:prstGeom prst="rect">
+            <a:avLst/>
+          </a:prstGeom>
+          <a:noFill/>
+        </p:spPr>
+        <p:txBody>
+          <a:bodyPr wrap="none" rtlCol="0">
+            <a:spAutoFit/>
+          </a:bodyPr>
+          <a:lstStyle/>
+          <a:p>
+            <a:pPr algn="ctr"/>
+            <a:r>
+              <a:rPr lang="en-US" b="1" dirty="0"/>
+              <a:t>Summary of mapped taxon pair age data</a:t>
+            </a:r>
+          </a:p>
+        </p:txBody>
+      </p:sp>
     </p:spTree>
     <p:extLst>
       <p:ext uri="{BB962C8B-B14F-4D97-AF65-F5344CB8AC3E}">

</xml_diff>